<commit_message>
adiciona comentário e retira typo
</commit_message>
<xml_diff>
--- a/segregated dom v2.pptx
+++ b/segregated dom v2.pptx
@@ -2617,7 +2617,7 @@
       </p:grpSpPr>
       <p:sp>
         <p:nvSpPr>
-          <p:cNvPr id="90" name="Shape 90"/>
+          <p:cNvPr id="91" name="Shape 91"/>
           <p:cNvSpPr/>
           <p:nvPr>
             <p:ph type="title"/>
@@ -2660,7 +2660,7 @@
       </p:sp>
       <p:pic>
         <p:nvPicPr>
-          <p:cNvPr id="91" name="pasted-image.png"/>
+          <p:cNvPr id="92" name="pasted-image.png"/>
           <p:cNvPicPr/>
           <p:nvPr/>
         </p:nvPicPr>
@@ -2685,6 +2685,65 @@
           </a:ln>
         </p:spPr>
       </p:pic>
+      <p:sp>
+        <p:nvSpPr>
+          <p:cNvPr id="93" name="Shape 93"/>
+          <p:cNvSpPr/>
+          <p:nvPr/>
+        </p:nvSpPr>
+        <p:spPr>
+          <a:xfrm>
+            <a:off x="7135750" y="8007387"/>
+            <a:ext cx="4778500" cy="673026"/>
+          </a:xfrm>
+          <a:prstGeom prst="rect">
+            <a:avLst/>
+          </a:prstGeom>
+          <a:ln w="12700">
+            <a:miter lim="400000"/>
+          </a:ln>
+          <a:extLst>
+            <a:ext uri="{C572A759-6A51-4108-AA02-DFA0A04FC94B}">
+              <ma14:wrappingTextBoxFlag xmlns:ma14="http://schemas.microsoft.com/office/mac/drawingml/2011/main" val="1"/>
+            </a:ext>
+          </a:extLst>
+        </p:spPr>
+        <p:txBody>
+          <a:bodyPr wrap="none" lIns="50800" tIns="50800" rIns="50800" bIns="50800" anchor="ctr">
+            <a:spAutoFit/>
+          </a:bodyPr>
+          <a:lstStyle>
+            <a:lvl1pPr>
+              <a:defRPr>
+                <a:solidFill>
+                  <a:srgbClr val="E8A433"/>
+                </a:solidFill>
+                <a:latin typeface="Monaco"/>
+                <a:ea typeface="Monaco"/>
+                <a:cs typeface="Monaco"/>
+                <a:sym typeface="Monaco"/>
+              </a:defRPr>
+            </a:lvl1pPr>
+          </a:lstStyle>
+          <a:p>
+            <a:pPr lvl="0">
+              <a:defRPr sz="1800">
+                <a:solidFill>
+                  <a:srgbClr val="000000"/>
+                </a:solidFill>
+              </a:defRPr>
+            </a:pPr>
+            <a:r>
+              <a:rPr sz="3600">
+                <a:solidFill>
+                  <a:srgbClr val="E8A433"/>
+                </a:solidFill>
+              </a:rPr>
+              <a:t>form.prezLayer.js</a:t>
+            </a:r>
+          </a:p>
+        </p:txBody>
+      </p:sp>
     </p:spTree>
   </p:cSld>
   <p:clrMapOvr>
@@ -2720,7 +2779,7 @@
       </p:grpSpPr>
       <p:sp>
         <p:nvSpPr>
-          <p:cNvPr id="93" name="Shape 93"/>
+          <p:cNvPr id="95" name="Shape 95"/>
           <p:cNvSpPr/>
           <p:nvPr>
             <p:ph type="title"/>
@@ -2763,7 +2822,7 @@
       </p:sp>
       <p:pic>
         <p:nvPicPr>
-          <p:cNvPr id="94" name="pasted-image.png"/>
+          <p:cNvPr id="96" name="pasted-image.png"/>
           <p:cNvPicPr/>
           <p:nvPr/>
         </p:nvPicPr>
@@ -2788,6 +2847,65 @@
           </a:ln>
         </p:spPr>
       </p:pic>
+      <p:sp>
+        <p:nvSpPr>
+          <p:cNvPr id="97" name="Shape 97"/>
+          <p:cNvSpPr/>
+          <p:nvPr/>
+        </p:nvSpPr>
+        <p:spPr>
+          <a:xfrm>
+            <a:off x="6538738" y="7219987"/>
+            <a:ext cx="6150324" cy="673026"/>
+          </a:xfrm>
+          <a:prstGeom prst="rect">
+            <a:avLst/>
+          </a:prstGeom>
+          <a:ln w="12700">
+            <a:miter lim="400000"/>
+          </a:ln>
+          <a:extLst>
+            <a:ext uri="{C572A759-6A51-4108-AA02-DFA0A04FC94B}">
+              <ma14:wrappingTextBoxFlag xmlns:ma14="http://schemas.microsoft.com/office/mac/drawingml/2011/main" val="1"/>
+            </a:ext>
+          </a:extLst>
+        </p:spPr>
+        <p:txBody>
+          <a:bodyPr wrap="none" lIns="50800" tIns="50800" rIns="50800" bIns="50800" anchor="ctr">
+            <a:spAutoFit/>
+          </a:bodyPr>
+          <a:lstStyle>
+            <a:lvl1pPr>
+              <a:defRPr>
+                <a:solidFill>
+                  <a:srgbClr val="E8A433"/>
+                </a:solidFill>
+                <a:latin typeface="Monaco"/>
+                <a:ea typeface="Monaco"/>
+                <a:cs typeface="Monaco"/>
+                <a:sym typeface="Monaco"/>
+              </a:defRPr>
+            </a:lvl1pPr>
+          </a:lstStyle>
+          <a:p>
+            <a:pPr lvl="0">
+              <a:defRPr sz="1800">
+                <a:solidFill>
+                  <a:srgbClr val="000000"/>
+                </a:solidFill>
+              </a:defRPr>
+            </a:pPr>
+            <a:r>
+              <a:rPr sz="3600">
+                <a:solidFill>
+                  <a:srgbClr val="E8A433"/>
+                </a:solidFill>
+              </a:rPr>
+              <a:t>form.prezLayer.test.js</a:t>
+            </a:r>
+          </a:p>
+        </p:txBody>
+      </p:sp>
     </p:spTree>
   </p:cSld>
   <p:clrMapOvr>
@@ -2821,52 +2939,9 @@
           <a:chExt cx="0" cy="0"/>
         </a:xfrm>
       </p:grpSpPr>
-      <p:sp>
-        <p:nvSpPr>
-          <p:cNvPr id="96" name="Shape 96"/>
-          <p:cNvSpPr/>
-          <p:nvPr>
-            <p:ph type="title"/>
-          </p:nvPr>
-        </p:nvSpPr>
-        <p:spPr>
-          <a:xfrm>
-            <a:off x="952500" y="552598"/>
-            <a:ext cx="11099800" cy="1561804"/>
-          </a:xfrm>
-          <a:prstGeom prst="rect">
-            <a:avLst/>
-          </a:prstGeom>
-        </p:spPr>
-        <p:txBody>
-          <a:bodyPr/>
-          <a:lstStyle>
-            <a:lvl1pPr>
-              <a:defRPr sz="3800">
-                <a:solidFill>
-                  <a:srgbClr val="000000"/>
-                </a:solidFill>
-                <a:latin typeface="Monaco"/>
-                <a:ea typeface="Monaco"/>
-                <a:cs typeface="Monaco"/>
-                <a:sym typeface="Monaco"/>
-              </a:defRPr>
-            </a:lvl1pPr>
-          </a:lstStyle>
-          <a:p>
-            <a:pPr lvl="0">
-              <a:defRPr sz="1800"/>
-            </a:pPr>
-            <a:r>
-              <a:rPr sz="3800"/>
-              <a:t>além de isolarmos nossa lógica dos seletores diretos…</a:t>
-            </a:r>
-          </a:p>
-        </p:txBody>
-      </p:sp>
       <p:pic>
         <p:nvPicPr>
-          <p:cNvPr id="97" name="pasted-image.png"/>
+          <p:cNvPr id="99" name="pasted-image.png"/>
           <p:cNvPicPr/>
           <p:nvPr/>
         </p:nvPicPr>
@@ -2880,8 +2955,8 @@
         </p:blipFill>
         <p:spPr>
           <a:xfrm>
-            <a:off x="617783" y="2264760"/>
-            <a:ext cx="11769234" cy="6951280"/>
+            <a:off x="711200" y="2216094"/>
+            <a:ext cx="11592346" cy="7048612"/>
           </a:xfrm>
           <a:prstGeom prst="rect">
             <a:avLst/>
@@ -2891,6 +2966,108 @@
           </a:ln>
         </p:spPr>
       </p:pic>
+      <p:sp>
+        <p:nvSpPr>
+          <p:cNvPr id="100" name="Shape 100"/>
+          <p:cNvSpPr/>
+          <p:nvPr>
+            <p:ph type="title"/>
+          </p:nvPr>
+        </p:nvSpPr>
+        <p:spPr>
+          <a:xfrm>
+            <a:off x="952500" y="552598"/>
+            <a:ext cx="11099800" cy="1561804"/>
+          </a:xfrm>
+          <a:prstGeom prst="rect">
+            <a:avLst/>
+          </a:prstGeom>
+        </p:spPr>
+        <p:txBody>
+          <a:bodyPr/>
+          <a:lstStyle>
+            <a:lvl1pPr>
+              <a:defRPr sz="3800">
+                <a:solidFill>
+                  <a:srgbClr val="000000"/>
+                </a:solidFill>
+                <a:latin typeface="Monaco"/>
+                <a:ea typeface="Monaco"/>
+                <a:cs typeface="Monaco"/>
+                <a:sym typeface="Monaco"/>
+              </a:defRPr>
+            </a:lvl1pPr>
+          </a:lstStyle>
+          <a:p>
+            <a:pPr lvl="0">
+              <a:defRPr sz="1800"/>
+            </a:pPr>
+            <a:r>
+              <a:rPr sz="3800"/>
+              <a:t>além de isolarmos nossa lógica dos seletores diretos…</a:t>
+            </a:r>
+          </a:p>
+        </p:txBody>
+      </p:sp>
+      <p:sp>
+        <p:nvSpPr>
+          <p:cNvPr id="101" name="Shape 101"/>
+          <p:cNvSpPr/>
+          <p:nvPr/>
+        </p:nvSpPr>
+        <p:spPr>
+          <a:xfrm>
+            <a:off x="10209373" y="8578887"/>
+            <a:ext cx="2034854" cy="673026"/>
+          </a:xfrm>
+          <a:prstGeom prst="rect">
+            <a:avLst/>
+          </a:prstGeom>
+          <a:ln w="12700">
+            <a:miter lim="400000"/>
+          </a:ln>
+          <a:extLst>
+            <a:ext uri="{C572A759-6A51-4108-AA02-DFA0A04FC94B}">
+              <ma14:wrappingTextBoxFlag xmlns:ma14="http://schemas.microsoft.com/office/mac/drawingml/2011/main" val="1"/>
+            </a:ext>
+          </a:extLst>
+        </p:spPr>
+        <p:txBody>
+          <a:bodyPr wrap="none" lIns="50800" tIns="50800" rIns="50800" bIns="50800" anchor="ctr">
+            <a:spAutoFit/>
+          </a:bodyPr>
+          <a:lstStyle>
+            <a:lvl1pPr>
+              <a:defRPr>
+                <a:solidFill>
+                  <a:srgbClr val="E8A433"/>
+                </a:solidFill>
+                <a:latin typeface="Monaco"/>
+                <a:ea typeface="Monaco"/>
+                <a:cs typeface="Monaco"/>
+                <a:sym typeface="Monaco"/>
+              </a:defRPr>
+            </a:lvl1pPr>
+          </a:lstStyle>
+          <a:p>
+            <a:pPr lvl="0">
+              <a:defRPr sz="1800">
+                <a:solidFill>
+                  <a:srgbClr val="000000"/>
+                </a:solidFill>
+              </a:defRPr>
+            </a:pPr>
+            <a:r>
+              <a:rPr sz="3600">
+                <a:solidFill>
+                  <a:srgbClr val="E8A433"/>
+                </a:solidFill>
+              </a:rPr>
+              <a:t>form.js</a:t>
+            </a:r>
+          </a:p>
+        </p:txBody>
+      </p:sp>
     </p:spTree>
   </p:cSld>
   <p:clrMapOvr>
@@ -2926,7 +3103,7 @@
       </p:grpSpPr>
       <p:sp>
         <p:nvSpPr>
-          <p:cNvPr id="99" name="Shape 99"/>
+          <p:cNvPr id="103" name="Shape 103"/>
           <p:cNvSpPr/>
           <p:nvPr>
             <p:ph type="title"/>
@@ -2934,7 +3111,7 @@
         </p:nvSpPr>
         <p:spPr>
           <a:xfrm>
-            <a:off x="733214" y="1556720"/>
+            <a:off x="727788" y="1556720"/>
             <a:ext cx="11354644" cy="1561803"/>
           </a:xfrm>
           <a:prstGeom prst="rect">
@@ -2969,7 +3146,7 @@
       </p:sp>
       <p:pic>
         <p:nvPicPr>
-          <p:cNvPr id="100" name="pasted-image.png"/>
+          <p:cNvPr id="104" name="pasted-image.png"/>
           <p:cNvPicPr/>
           <p:nvPr/>
         </p:nvPicPr>
@@ -2983,7 +3160,7 @@
         </p:blipFill>
         <p:spPr>
           <a:xfrm>
-            <a:off x="804329" y="3821429"/>
+            <a:off x="798903" y="3821429"/>
             <a:ext cx="11467257" cy="4375451"/>
           </a:xfrm>
           <a:prstGeom prst="rect">
@@ -2994,6 +3171,65 @@
           </a:ln>
         </p:spPr>
       </p:pic>
+      <p:sp>
+        <p:nvSpPr>
+          <p:cNvPr id="105" name="Shape 105"/>
+          <p:cNvSpPr/>
+          <p:nvPr/>
+        </p:nvSpPr>
+        <p:spPr>
+          <a:xfrm>
+            <a:off x="8870336" y="7512087"/>
+            <a:ext cx="3406676" cy="673026"/>
+          </a:xfrm>
+          <a:prstGeom prst="rect">
+            <a:avLst/>
+          </a:prstGeom>
+          <a:ln w="12700">
+            <a:miter lim="400000"/>
+          </a:ln>
+          <a:extLst>
+            <a:ext uri="{C572A759-6A51-4108-AA02-DFA0A04FC94B}">
+              <ma14:wrappingTextBoxFlag xmlns:ma14="http://schemas.microsoft.com/office/mac/drawingml/2011/main" val="1"/>
+            </a:ext>
+          </a:extLst>
+        </p:spPr>
+        <p:txBody>
+          <a:bodyPr wrap="none" lIns="50800" tIns="50800" rIns="50800" bIns="50800" anchor="ctr">
+            <a:spAutoFit/>
+          </a:bodyPr>
+          <a:lstStyle>
+            <a:lvl1pPr>
+              <a:defRPr>
+                <a:solidFill>
+                  <a:srgbClr val="E8A433"/>
+                </a:solidFill>
+                <a:latin typeface="Monaco"/>
+                <a:ea typeface="Monaco"/>
+                <a:cs typeface="Monaco"/>
+                <a:sym typeface="Monaco"/>
+              </a:defRPr>
+            </a:lvl1pPr>
+          </a:lstStyle>
+          <a:p>
+            <a:pPr lvl="0">
+              <a:defRPr sz="1800">
+                <a:solidFill>
+                  <a:srgbClr val="000000"/>
+                </a:solidFill>
+              </a:defRPr>
+            </a:pPr>
+            <a:r>
+              <a:rPr sz="3600">
+                <a:solidFill>
+                  <a:srgbClr val="E8A433"/>
+                </a:solidFill>
+              </a:rPr>
+              <a:t>form.test.js</a:t>
+            </a:r>
+          </a:p>
+        </p:txBody>
+      </p:sp>
     </p:spTree>
   </p:cSld>
   <p:clrMapOvr>
@@ -3029,7 +3265,7 @@
       </p:grpSpPr>
       <p:sp>
         <p:nvSpPr>
-          <p:cNvPr id="102" name="Shape 102"/>
+          <p:cNvPr id="107" name="Shape 107"/>
           <p:cNvSpPr/>
           <p:nvPr>
             <p:ph type="title"/>
@@ -3072,7 +3308,7 @@
       </p:sp>
       <p:sp>
         <p:nvSpPr>
-          <p:cNvPr id="103" name="Shape 103"/>
+          <p:cNvPr id="108" name="Shape 108"/>
           <p:cNvSpPr/>
           <p:nvPr/>
         </p:nvSpPr>
@@ -3103,7 +3339,7 @@
       </p:sp>
       <p:sp>
         <p:nvSpPr>
-          <p:cNvPr id="104" name="Shape 104"/>
+          <p:cNvPr id="109" name="Shape 109"/>
           <p:cNvSpPr/>
           <p:nvPr/>
         </p:nvSpPr>
@@ -3159,7 +3395,7 @@
       </p:sp>
       <p:sp>
         <p:nvSpPr>
-          <p:cNvPr id="105" name="Shape 105"/>
+          <p:cNvPr id="110" name="Shape 110"/>
           <p:cNvSpPr/>
           <p:nvPr/>
         </p:nvSpPr>
@@ -3190,14 +3426,14 @@
       </p:sp>
       <p:sp>
         <p:nvSpPr>
-          <p:cNvPr id="106" name="Shape 106"/>
+          <p:cNvPr id="111" name="Shape 111"/>
           <p:cNvSpPr/>
           <p:nvPr/>
         </p:nvSpPr>
         <p:spPr>
           <a:xfrm>
             <a:off x="5073426" y="3863834"/>
-            <a:ext cx="2857948" cy="673027"/>
+            <a:ext cx="2857948" cy="673026"/>
           </a:xfrm>
           <a:prstGeom prst="rect">
             <a:avLst/>
@@ -3246,14 +3482,14 @@
       </p:sp>
       <p:sp>
         <p:nvSpPr>
-          <p:cNvPr id="107" name="Shape 107"/>
+          <p:cNvPr id="112" name="Shape 112"/>
           <p:cNvSpPr/>
           <p:nvPr/>
         </p:nvSpPr>
         <p:spPr>
           <a:xfrm>
-            <a:off x="3678634" y="4975196"/>
-            <a:ext cx="5647532" cy="1046687"/>
+            <a:off x="3678634" y="4975195"/>
+            <a:ext cx="5647532" cy="1046688"/>
           </a:xfrm>
           <a:prstGeom prst="rect">
             <a:avLst/>
@@ -3277,7 +3513,7 @@
       </p:sp>
       <p:sp>
         <p:nvSpPr>
-          <p:cNvPr id="108" name="Shape 108"/>
+          <p:cNvPr id="113" name="Shape 113"/>
           <p:cNvSpPr/>
           <p:nvPr/>
         </p:nvSpPr>
@@ -3333,7 +3569,7 @@
       </p:sp>
       <p:sp>
         <p:nvSpPr>
-          <p:cNvPr id="109" name="Shape 109"/>
+          <p:cNvPr id="114" name="Shape 114"/>
           <p:cNvSpPr/>
           <p:nvPr/>
         </p:nvSpPr>
@@ -3364,7 +3600,7 @@
       </p:sp>
       <p:sp>
         <p:nvSpPr>
-          <p:cNvPr id="110" name="Shape 110"/>
+          <p:cNvPr id="115" name="Shape 115"/>
           <p:cNvSpPr/>
           <p:nvPr/>
         </p:nvSpPr>
@@ -3453,7 +3689,7 @@
       </p:grpSpPr>
       <p:sp>
         <p:nvSpPr>
-          <p:cNvPr id="112" name="Shape 112"/>
+          <p:cNvPr id="117" name="Shape 117"/>
           <p:cNvSpPr/>
           <p:nvPr>
             <p:ph type="title"/>
@@ -3496,7 +3732,7 @@
       </p:sp>
       <p:sp>
         <p:nvSpPr>
-          <p:cNvPr id="113" name="Shape 113"/>
+          <p:cNvPr id="118" name="Shape 118"/>
           <p:cNvSpPr/>
           <p:nvPr/>
         </p:nvSpPr>
@@ -3580,7 +3816,7 @@
       </p:grpSpPr>
       <p:sp>
         <p:nvSpPr>
-          <p:cNvPr id="115" name="Shape 115"/>
+          <p:cNvPr id="120" name="Shape 120"/>
           <p:cNvSpPr/>
           <p:nvPr>
             <p:ph type="title"/>
@@ -3623,7 +3859,7 @@
       </p:sp>
       <p:sp>
         <p:nvSpPr>
-          <p:cNvPr id="116" name="Shape 116"/>
+          <p:cNvPr id="121" name="Shape 121"/>
           <p:cNvSpPr/>
           <p:nvPr/>
         </p:nvSpPr>
@@ -3674,7 +3910,7 @@
       </p:sp>
       <p:sp>
         <p:nvSpPr>
-          <p:cNvPr id="117" name="Shape 117"/>
+          <p:cNvPr id="122" name="Shape 122"/>
           <p:cNvSpPr/>
           <p:nvPr/>
         </p:nvSpPr>
@@ -3728,7 +3964,7 @@
       </p:sp>
       <p:pic>
         <p:nvPicPr>
-          <p:cNvPr id="118" name="pasted-image.png"/>
+          <p:cNvPr id="123" name="pasted-image.png"/>
           <p:cNvPicPr/>
           <p:nvPr/>
         </p:nvPicPr>
@@ -3755,7 +3991,7 @@
       </p:pic>
       <p:sp>
         <p:nvSpPr>
-          <p:cNvPr id="119" name="Shape 119"/>
+          <p:cNvPr id="124" name="Shape 124"/>
           <p:cNvSpPr/>
           <p:nvPr/>
         </p:nvSpPr>
@@ -3806,7 +4042,7 @@
       </p:sp>
       <p:sp>
         <p:nvSpPr>
-          <p:cNvPr id="120" name="Shape 120"/>
+          <p:cNvPr id="125" name="Shape 125"/>
           <p:cNvSpPr/>
           <p:nvPr/>
         </p:nvSpPr>
@@ -5792,7 +6028,7 @@
                   <a:srgbClr val="FFFFFF"/>
                 </a:solidFill>
               </a:rPr>
-              <a:t>$(‘#id_name, #id_message')</a:t>
+              <a:t>$('#id_name, #id_message')</a:t>
             </a:r>
           </a:p>
         </p:txBody>
@@ -6201,6 +6437,65 @@
           </a:ln>
         </p:spPr>
       </p:pic>
+      <p:sp>
+        <p:nvSpPr>
+          <p:cNvPr id="89" name="Shape 89"/>
+          <p:cNvSpPr/>
+          <p:nvPr/>
+        </p:nvSpPr>
+        <p:spPr>
+          <a:xfrm>
+            <a:off x="8736062" y="2000287"/>
+            <a:ext cx="3406676" cy="673026"/>
+          </a:xfrm>
+          <a:prstGeom prst="rect">
+            <a:avLst/>
+          </a:prstGeom>
+          <a:ln w="12700">
+            <a:miter lim="400000"/>
+          </a:ln>
+          <a:extLst>
+            <a:ext uri="{C572A759-6A51-4108-AA02-DFA0A04FC94B}">
+              <ma14:wrappingTextBoxFlag xmlns:ma14="http://schemas.microsoft.com/office/mac/drawingml/2011/main" val="1"/>
+            </a:ext>
+          </a:extLst>
+        </p:spPr>
+        <p:txBody>
+          <a:bodyPr wrap="none" lIns="50800" tIns="50800" rIns="50800" bIns="50800" anchor="ctr">
+            <a:spAutoFit/>
+          </a:bodyPr>
+          <a:lstStyle>
+            <a:lvl1pPr>
+              <a:defRPr>
+                <a:solidFill>
+                  <a:srgbClr val="E8A433"/>
+                </a:solidFill>
+                <a:latin typeface="Monaco"/>
+                <a:ea typeface="Monaco"/>
+                <a:cs typeface="Monaco"/>
+                <a:sym typeface="Monaco"/>
+              </a:defRPr>
+            </a:lvl1pPr>
+          </a:lstStyle>
+          <a:p>
+            <a:pPr lvl="0">
+              <a:defRPr sz="1800">
+                <a:solidFill>
+                  <a:srgbClr val="000000"/>
+                </a:solidFill>
+              </a:defRPr>
+            </a:pPr>
+            <a:r>
+              <a:rPr sz="3600">
+                <a:solidFill>
+                  <a:srgbClr val="E8A433"/>
+                </a:solidFill>
+              </a:rPr>
+              <a:t>example.html</a:t>
+            </a:r>
+          </a:p>
+        </p:txBody>
+      </p:sp>
     </p:spTree>
   </p:cSld>
   <p:clrMapOvr>

</xml_diff>